<commit_message>
fixed typo on stating.png
</commit_message>
<xml_diff>
--- a/day2/fig/fig.pptx
+++ b/day2/fig/fig.pptx
@@ -6927,13 +6927,13 @@
         <p:nvCxnSpPr>
           <p:cNvPr id="32" name="直線矢印コネクタ 31"/>
           <p:cNvCxnSpPr>
-            <a:stCxn id="29" idx="3"/>
-            <a:endCxn id="31" idx="1"/>
+            <a:stCxn id="31" idx="1"/>
+            <a:endCxn id="29" idx="3"/>
           </p:cNvCxnSpPr>
           <p:nvPr/>
         </p:nvCxnSpPr>
         <p:spPr>
-          <a:xfrm>
+          <a:xfrm flipH="1">
             <a:off x="3003109" y="5669885"/>
             <a:ext cx="2179934" cy="0"/>
           </a:xfrm>

</xml_diff>